<commit_message>
Updated PPTX Journey Deck
</commit_message>
<xml_diff>
--- a/My_Trading_Bot_Journey.pptx
+++ b/My_Trading_Bot_Journey.pptx
@@ -10,6 +10,9 @@
     <p:sldId id="258" r:id="rId9"/>
     <p:sldId id="259" r:id="rId10"/>
     <p:sldId id="260" r:id="rId11"/>
+    <p:sldId id="261" r:id="rId12"/>
+    <p:sldId id="262" r:id="rId13"/>
+    <p:sldId id="263" r:id="rId14"/>
   </p:sldIdLst>
   <p:sldSz cx="9144000" cy="6858000" type="screen4x3"/>
   <p:notesSz cx="6858000" cy="9144000"/>
@@ -3108,7 +3111,7 @@
           <a:lstStyle/>
           <a:p>
             <a:r>
-              <a:t>Building My First Python Trading Bot</a:t>
+              <a:t>The Developer's Journey</a:t>
             </a:r>
           </a:p>
         </p:txBody>
@@ -3129,12 +3132,12 @@
           <a:lstStyle/>
           <a:p>
             <a:r>
-              <a:t>A Journey from Zero to Automation</a:t>
-            </a:r>
-          </a:p>
-          <a:p>
-            <a:r>
-              <a:t>February 2026</a:t>
+              <a:t>Building &amp; Publishing a Python Trading Bot</a:t>
+            </a:r>
+          </a:p>
+          <a:p>
+            <a:r>
+              <a:t>From Zero to GitHub</a:t>
             </a:r>
           </a:p>
         </p:txBody>
@@ -3173,7 +3176,7 @@
           <a:lstStyle/>
           <a:p>
             <a:r>
-              <a:t>Phase 1: The Setup</a:t>
+              <a:t>Step 1: The Vision</a:t>
             </a:r>
           </a:p>
         </p:txBody>
@@ -3194,22 +3197,25 @@
           <a:lstStyle/>
           <a:p>
             <a:r>
-              <a:t>Installed Visual Studio Code (The Workshop).</a:t>
-            </a:r>
-          </a:p>
-          <a:p>
-            <a:r>
-              <a:t>Installed Python (The Engine).</a:t>
-            </a:r>
-          </a:p>
-          <a:p>
-            <a:r>
-              <a:t>Learned to use the Terminal to install libraries.</a:t>
-            </a:r>
-          </a:p>
-          <a:p>
-            <a:r>
-              <a:t>Key Library Used: 'yfinance' (Connects to Yahoo Finance API).</a:t>
+              <a:t>Objective: Build an automated stock trading assistant.</a:t>
+            </a:r>
+          </a:p>
+          <a:p>
+            <a:pPr/>
+            <a:r>
+              <a:t>The Problem: We cannot watch the screen 24/7.</a:t>
+            </a:r>
+          </a:p>
+          <a:p>
+            <a:pPr/>
+            <a:r>
+              <a:t>The Solution: A Python script that watches, thinks, and alerts.</a:t>
+            </a:r>
+          </a:p>
+          <a:p>
+            <a:pPr/>
+            <a:r>
+              <a:t>Tools Selected: VS Code (Editor), Python 3.13 (Engine).</a:t>
             </a:r>
           </a:p>
         </p:txBody>
@@ -3248,7 +3254,7 @@
           <a:lstStyle/>
           <a:p>
             <a:r>
-              <a:t>Phase 2: The First Script</a:t>
+              <a:t>Step 2: The Logic (The 'Trifecta')</a:t>
             </a:r>
           </a:p>
         </p:txBody>
@@ -3269,27 +3275,31 @@
           <a:lstStyle/>
           <a:p>
             <a:r>
-              <a:t>Goal: Fetch a single stock price.</a:t>
-            </a:r>
-          </a:p>
-          <a:p>
-            <a:r>
-              <a:t>Learned how to import libraries.</a:t>
-            </a:r>
-          </a:p>
-          <a:p>
-            <a:r>
-              <a:t>Wrote code to 'Ask' Yahoo for NVDA data.</a:t>
-            </a:r>
-          </a:p>
-          <a:p>
-            <a:r>
-              <a:t>Success: Printed '$182.81' to the terminal.</a:t>
-            </a:r>
-          </a:p>
-          <a:p>
-            <a:r>
-              <a:t>Realization: This was a script, not a bot (it didn't loop).</a:t>
+              <a:t>We programmed the bot to think like a disciplined trader.</a:t>
+            </a:r>
+          </a:p>
+          <a:p>
+            <a:pPr/>
+            <a:r>
+              <a:t>Indicator 1: SMA (20) - Is the trend up?</a:t>
+            </a:r>
+          </a:p>
+          <a:p>
+            <a:pPr/>
+            <a:r>
+              <a:t>Indicator 2: RSI (14) - Is the price fair?</a:t>
+            </a:r>
+          </a:p>
+          <a:p>
+            <a:pPr/>
+            <a:r>
+              <a:t>Indicator 3: MACD (12,26,9) - Is momentum building?</a:t>
+            </a:r>
+          </a:p>
+          <a:p>
+            <a:pPr/>
+            <a:r>
+              <a:t>Rule: The bot only signals when ALL three agree.</a:t>
             </a:r>
           </a:p>
         </p:txBody>
@@ -3328,7 +3338,7 @@
           <a:lstStyle/>
           <a:p>
             <a:r>
-              <a:t>Phase 3: The Loop (Bot Mode)</a:t>
+              <a:t>Step 3: Automation &amp; Alerts</a:t>
             </a:r>
           </a:p>
         </p:txBody>
@@ -3349,27 +3359,25 @@
           <a:lstStyle/>
           <a:p>
             <a:r>
-              <a:t>Goal: Make it run automatically.</a:t>
-            </a:r>
-          </a:p>
-          <a:p>
-            <a:r>
-              <a:t>Added a 'While True' loop (Infinite Loop).</a:t>
-            </a:r>
-          </a:p>
-          <a:p>
-            <a:r>
-              <a:t>Added 'Time.sleep(10)' to prevent crashing the computer.</a:t>
-            </a:r>
-          </a:p>
-          <a:p>
-            <a:r>
-              <a:t>Result: The script now watches the market 24/7.</a:t>
-            </a:r>
-          </a:p>
-          <a:p>
-            <a:r>
-              <a:t>It prints a new price update every 10 seconds.</a:t>
+              <a:t>Challenge: Making it run forever.</a:t>
+            </a:r>
+          </a:p>
+          <a:p>
+            <a:pPr/>
+            <a:r>
+              <a:t>Solution: Implemented a 'While True' infinite loop.</a:t>
+            </a:r>
+          </a:p>
+          <a:p>
+            <a:pPr/>
+            <a:r>
+              <a:t>The Voice: Added 'plyer' to trigger Windows Desktop Notifications.</a:t>
+            </a:r>
+          </a:p>
+          <a:p>
+            <a:pPr/>
+            <a:r>
+              <a:t>The Result: The user can work on other tasks while the bot guards the portfolio.</a:t>
             </a:r>
           </a:p>
         </p:txBody>
@@ -3408,7 +3416,7 @@
           <a:lstStyle/>
           <a:p>
             <a:r>
-              <a:t>Phase 4: Future Goals</a:t>
+              <a:t>Step 4: Persistent Logging</a:t>
             </a:r>
           </a:p>
         </p:txBody>
@@ -3429,22 +3437,265 @@
           <a:lstStyle/>
           <a:p>
             <a:r>
-              <a:t>Add 'Logic': Only notify me if price drops below $180.</a:t>
-            </a:r>
-          </a:p>
-          <a:p>
-            <a:r>
-              <a:t>Paper Trading: Connect to a fake money account.</a:t>
-            </a:r>
-          </a:p>
-          <a:p>
-            <a:r>
-              <a:t>Expansion: Move from Webull (Manual) to API Trading.</a:t>
-            </a:r>
-          </a:p>
-          <a:p>
-            <a:r>
-              <a:t>Goal: Fully automated swing trading assistance.</a:t>
+              <a:t>Challenge: How do we know what the bot did while we slept?</a:t>
+            </a:r>
+          </a:p>
+          <a:p>
+            <a:pPr/>
+            <a:r>
+              <a:t>Solution: Added a CSV Logger.</a:t>
+            </a:r>
+          </a:p>
+          <a:p>
+            <a:pPr/>
+            <a:r>
+              <a:t>Mechanism: Python opens 'trade_log.csv' and appends every Buy/Sell decision.</a:t>
+            </a:r>
+          </a:p>
+          <a:p>
+            <a:pPr/>
+            <a:r>
+              <a:t>Benefit: Creates a permanent audit trail for backtesting and review.</a:t>
+            </a:r>
+          </a:p>
+        </p:txBody>
+      </p:sp>
+    </p:spTree>
+  </p:cSld>
+  <p:clrMapOvr>
+    <a:masterClrMapping/>
+  </p:clrMapOvr>
+</p:sld>
+</file>
+
+<file path=ppt/slides/slide6.xml><?xml version="1.0" encoding="utf-8"?>
+<p:sld xmlns:a="http://schemas.openxmlformats.org/drawingml/2006/main" xmlns:p="http://schemas.openxmlformats.org/presentationml/2006/main" xmlns:r="http://schemas.openxmlformats.org/officeDocument/2006/relationships">
+  <p:cSld>
+    <p:spTree>
+      <p:nvGrpSpPr>
+        <p:cNvPr id="1" name=""/>
+        <p:cNvGrpSpPr/>
+        <p:nvPr/>
+      </p:nvGrpSpPr>
+      <p:grpSpPr/>
+      <p:sp>
+        <p:nvSpPr>
+          <p:cNvPr id="2" name="Title 1"/>
+          <p:cNvSpPr>
+            <a:spLocks noGrp="1"/>
+          </p:cNvSpPr>
+          <p:nvPr>
+            <p:ph type="title"/>
+          </p:nvPr>
+        </p:nvSpPr>
+        <p:spPr/>
+        <p:txBody>
+          <a:bodyPr/>
+          <a:lstStyle/>
+          <a:p>
+            <a:r>
+              <a:t>Step 5: Version Control (Git)</a:t>
+            </a:r>
+          </a:p>
+        </p:txBody>
+      </p:sp>
+      <p:sp>
+        <p:nvSpPr>
+          <p:cNvPr id="3" name="Content Placeholder 2"/>
+          <p:cNvSpPr>
+            <a:spLocks noGrp="1"/>
+          </p:cNvSpPr>
+          <p:nvPr>
+            <p:ph idx="1"/>
+          </p:nvPr>
+        </p:nvSpPr>
+        <p:spPr/>
+        <p:txBody>
+          <a:bodyPr/>
+          <a:lstStyle/>
+          <a:p>
+            <a:r>
+              <a:t>We turned our folder into a Repository.</a:t>
+            </a:r>
+          </a:p>
+          <a:p>
+            <a:pPr/>
+            <a:r>
+              <a:t>Git Init: Started tracking changes.</a:t>
+            </a:r>
+          </a:p>
+          <a:p>
+            <a:pPr/>
+            <a:r>
+              <a:t>Git Add/Commit: Saved 'snapshots' of our code.</a:t>
+            </a:r>
+          </a:p>
+          <a:p>
+            <a:pPr/>
+            <a:r>
+              <a:t>Why? To prevent data loss and allow us to 'rewind' if we break something.</a:t>
+            </a:r>
+          </a:p>
+        </p:txBody>
+      </p:sp>
+    </p:spTree>
+  </p:cSld>
+  <p:clrMapOvr>
+    <a:masterClrMapping/>
+  </p:clrMapOvr>
+</p:sld>
+</file>
+
+<file path=ppt/slides/slide7.xml><?xml version="1.0" encoding="utf-8"?>
+<p:sld xmlns:a="http://schemas.openxmlformats.org/drawingml/2006/main" xmlns:p="http://schemas.openxmlformats.org/presentationml/2006/main" xmlns:r="http://schemas.openxmlformats.org/officeDocument/2006/relationships">
+  <p:cSld>
+    <p:spTree>
+      <p:nvGrpSpPr>
+        <p:cNvPr id="1" name=""/>
+        <p:cNvGrpSpPr/>
+        <p:nvPr/>
+      </p:nvGrpSpPr>
+      <p:grpSpPr/>
+      <p:sp>
+        <p:nvSpPr>
+          <p:cNvPr id="2" name="Title 1"/>
+          <p:cNvSpPr>
+            <a:spLocks noGrp="1"/>
+          </p:cNvSpPr>
+          <p:nvPr>
+            <p:ph type="title"/>
+          </p:nvPr>
+        </p:nvSpPr>
+        <p:spPr/>
+        <p:txBody>
+          <a:bodyPr/>
+          <a:lstStyle/>
+          <a:p>
+            <a:r>
+              <a:t>Step 6: Publishing to the Cloud (GitHub)</a:t>
+            </a:r>
+          </a:p>
+        </p:txBody>
+      </p:sp>
+      <p:sp>
+        <p:nvSpPr>
+          <p:cNvPr id="3" name="Content Placeholder 2"/>
+          <p:cNvSpPr>
+            <a:spLocks noGrp="1"/>
+          </p:cNvSpPr>
+          <p:nvPr>
+            <p:ph idx="1"/>
+          </p:nvPr>
+        </p:nvSpPr>
+        <p:spPr/>
+        <p:txBody>
+          <a:bodyPr/>
+          <a:lstStyle/>
+          <a:p>
+            <a:r>
+              <a:t>Final Step: Uploading to the world.</a:t>
+            </a:r>
+          </a:p>
+          <a:p>
+            <a:pPr/>
+            <a:r>
+              <a:t>Remote Repo: Created a secure box on GitHub.com.</a:t>
+            </a:r>
+          </a:p>
+          <a:p>
+            <a:pPr/>
+            <a:r>
+              <a:t>Push: Sent our local code to the cloud.</a:t>
+            </a:r>
+          </a:p>
+          <a:p>
+            <a:pPr/>
+            <a:r>
+              <a:t>Authentication: Secured the connection using a Personal Access Token (PAT).</a:t>
+            </a:r>
+          </a:p>
+          <a:p>
+            <a:pPr/>
+            <a:r>
+              <a:t>Outcome: The code is now safe, shareable, and professional.</a:t>
+            </a:r>
+          </a:p>
+        </p:txBody>
+      </p:sp>
+    </p:spTree>
+  </p:cSld>
+  <p:clrMapOvr>
+    <a:masterClrMapping/>
+  </p:clrMapOvr>
+</p:sld>
+</file>
+
+<file path=ppt/slides/slide8.xml><?xml version="1.0" encoding="utf-8"?>
+<p:sld xmlns:a="http://schemas.openxmlformats.org/drawingml/2006/main" xmlns:p="http://schemas.openxmlformats.org/presentationml/2006/main" xmlns:r="http://schemas.openxmlformats.org/officeDocument/2006/relationships">
+  <p:cSld>
+    <p:spTree>
+      <p:nvGrpSpPr>
+        <p:cNvPr id="1" name=""/>
+        <p:cNvGrpSpPr/>
+        <p:nvPr/>
+      </p:nvGrpSpPr>
+      <p:grpSpPr/>
+      <p:sp>
+        <p:nvSpPr>
+          <p:cNvPr id="2" name="Title 1"/>
+          <p:cNvSpPr>
+            <a:spLocks noGrp="1"/>
+          </p:cNvSpPr>
+          <p:nvPr>
+            <p:ph type="title"/>
+          </p:nvPr>
+        </p:nvSpPr>
+        <p:spPr/>
+        <p:txBody>
+          <a:bodyPr/>
+          <a:lstStyle/>
+          <a:p>
+            <a:r>
+              <a:t>Future Roadmap</a:t>
+            </a:r>
+          </a:p>
+        </p:txBody>
+      </p:sp>
+      <p:sp>
+        <p:nvSpPr>
+          <p:cNvPr id="3" name="Content Placeholder 2"/>
+          <p:cNvSpPr>
+            <a:spLocks noGrp="1"/>
+          </p:cNvSpPr>
+          <p:nvPr>
+            <p:ph idx="1"/>
+          </p:nvPr>
+        </p:nvSpPr>
+        <p:spPr/>
+        <p:txBody>
+          <a:bodyPr/>
+          <a:lstStyle/>
+          <a:p>
+            <a:r>
+              <a:t>Phase 2: Cloud Hosting (Running 24/7 on a server).</a:t>
+            </a:r>
+          </a:p>
+          <a:p>
+            <a:pPr/>
+            <a:r>
+              <a:t>Phase 3: Salesforce Integration (Logging trades as CRM records).</a:t>
+            </a:r>
+          </a:p>
+          <a:p>
+            <a:pPr/>
+            <a:r>
+              <a:t>Phase 4: Backtesting (Simulating performance on past data).</a:t>
+            </a:r>
+          </a:p>
+          <a:p>
+            <a:pPr/>
+            <a:r>
+              <a:t>Status: Phase 1 Complete.</a:t>
             </a:r>
           </a:p>
         </p:txBody>

</xml_diff>